<commit_message>
Update Lecture 5 + Examples
</commit_message>
<xml_diff>
--- a/05-Loops.pptx
+++ b/05-Loops.pptx
@@ -325,7 +325,7 @@
           <a:p>
             <a:fld id="{3EA744D9-3FBE-48D8-BF2A-85DF203E4D20}" type="datetimeFigureOut">
               <a:rPr lang="bg-BG" smtClean="0"/>
-              <a:t>27.10.2015 г.</a:t>
+              <a:t>29.10.2015 г.</a:t>
             </a:fld>
             <a:endParaRPr lang="bg-BG"/>
           </a:p>
@@ -495,7 +495,7 @@
           <a:p>
             <a:fld id="{3EA744D9-3FBE-48D8-BF2A-85DF203E4D20}" type="datetimeFigureOut">
               <a:rPr lang="bg-BG" smtClean="0"/>
-              <a:t>27.10.2015 г.</a:t>
+              <a:t>29.10.2015 г.</a:t>
             </a:fld>
             <a:endParaRPr lang="bg-BG"/>
           </a:p>
@@ -675,7 +675,7 @@
           <a:p>
             <a:fld id="{3EA744D9-3FBE-48D8-BF2A-85DF203E4D20}" type="datetimeFigureOut">
               <a:rPr lang="bg-BG" smtClean="0"/>
-              <a:t>27.10.2015 г.</a:t>
+              <a:t>29.10.2015 г.</a:t>
             </a:fld>
             <a:endParaRPr lang="bg-BG"/>
           </a:p>
@@ -845,7 +845,7 @@
           <a:p>
             <a:fld id="{3EA744D9-3FBE-48D8-BF2A-85DF203E4D20}" type="datetimeFigureOut">
               <a:rPr lang="bg-BG" smtClean="0"/>
-              <a:t>27.10.2015 г.</a:t>
+              <a:t>29.10.2015 г.</a:t>
             </a:fld>
             <a:endParaRPr lang="bg-BG"/>
           </a:p>
@@ -1091,7 +1091,7 @@
           <a:p>
             <a:fld id="{3EA744D9-3FBE-48D8-BF2A-85DF203E4D20}" type="datetimeFigureOut">
               <a:rPr lang="bg-BG" smtClean="0"/>
-              <a:t>27.10.2015 г.</a:t>
+              <a:t>29.10.2015 г.</a:t>
             </a:fld>
             <a:endParaRPr lang="bg-BG"/>
           </a:p>
@@ -1379,7 +1379,7 @@
           <a:p>
             <a:fld id="{3EA744D9-3FBE-48D8-BF2A-85DF203E4D20}" type="datetimeFigureOut">
               <a:rPr lang="bg-BG" smtClean="0"/>
-              <a:t>27.10.2015 г.</a:t>
+              <a:t>29.10.2015 г.</a:t>
             </a:fld>
             <a:endParaRPr lang="bg-BG"/>
           </a:p>
@@ -1801,7 +1801,7 @@
           <a:p>
             <a:fld id="{3EA744D9-3FBE-48D8-BF2A-85DF203E4D20}" type="datetimeFigureOut">
               <a:rPr lang="bg-BG" smtClean="0"/>
-              <a:t>27.10.2015 г.</a:t>
+              <a:t>29.10.2015 г.</a:t>
             </a:fld>
             <a:endParaRPr lang="bg-BG"/>
           </a:p>
@@ -1919,7 +1919,7 @@
           <a:p>
             <a:fld id="{3EA744D9-3FBE-48D8-BF2A-85DF203E4D20}" type="datetimeFigureOut">
               <a:rPr lang="bg-BG" smtClean="0"/>
-              <a:t>27.10.2015 г.</a:t>
+              <a:t>29.10.2015 г.</a:t>
             </a:fld>
             <a:endParaRPr lang="bg-BG"/>
           </a:p>
@@ -2014,7 +2014,7 @@
           <a:p>
             <a:fld id="{3EA744D9-3FBE-48D8-BF2A-85DF203E4D20}" type="datetimeFigureOut">
               <a:rPr lang="bg-BG" smtClean="0"/>
-              <a:t>27.10.2015 г.</a:t>
+              <a:t>29.10.2015 г.</a:t>
             </a:fld>
             <a:endParaRPr lang="bg-BG"/>
           </a:p>
@@ -2291,7 +2291,7 @@
           <a:p>
             <a:fld id="{3EA744D9-3FBE-48D8-BF2A-85DF203E4D20}" type="datetimeFigureOut">
               <a:rPr lang="bg-BG" smtClean="0"/>
-              <a:t>27.10.2015 г.</a:t>
+              <a:t>29.10.2015 г.</a:t>
             </a:fld>
             <a:endParaRPr lang="bg-BG"/>
           </a:p>
@@ -2544,7 +2544,7 @@
           <a:p>
             <a:fld id="{3EA744D9-3FBE-48D8-BF2A-85DF203E4D20}" type="datetimeFigureOut">
               <a:rPr lang="bg-BG" smtClean="0"/>
-              <a:t>27.10.2015 г.</a:t>
+              <a:t>29.10.2015 г.</a:t>
             </a:fld>
             <a:endParaRPr lang="bg-BG"/>
           </a:p>
@@ -2766,7 +2766,7 @@
           <a:p>
             <a:fld id="{3EA744D9-3FBE-48D8-BF2A-85DF203E4D20}" type="datetimeFigureOut">
               <a:rPr lang="bg-BG" smtClean="0"/>
-              <a:t>27.10.2015 г.</a:t>
+              <a:t>29.10.2015 г.</a:t>
             </a:fld>
             <a:endParaRPr lang="bg-BG"/>
           </a:p>
@@ -3747,13 +3747,6 @@
               </a:rPr>
               <a:t> {</a:t>
             </a:r>
-            <a:endParaRPr lang="en-US" dirty="0" smtClean="0">
-              <a:solidFill>
-                <a:schemeClr val="bg1">
-                  <a:lumMod val="95000"/>
-                </a:schemeClr>
-              </a:solidFill>
-            </a:endParaRPr>
           </a:p>
           <a:p>
             <a:pPr marL="0" indent="0">
@@ -3948,25 +3941,8 @@
                   </a:schemeClr>
                 </a:solidFill>
               </a:rPr>
-              <a:t> </a:t>
-            </a:r>
-            <a:r>
-              <a:rPr lang="en-US" sz="2400" dirty="0" smtClean="0">
-                <a:solidFill>
-                  <a:schemeClr val="bg1">
-                    <a:lumMod val="95000"/>
-                  </a:schemeClr>
-                </a:solidFill>
-              </a:rPr>
-              <a:t>{</a:t>
-            </a:r>
-            <a:endParaRPr lang="en-US" sz="2400" dirty="0" smtClean="0">
-              <a:solidFill>
-                <a:schemeClr val="bg1">
-                  <a:lumMod val="95000"/>
-                </a:schemeClr>
-              </a:solidFill>
-            </a:endParaRPr>
+              <a:t> {</a:t>
+            </a:r>
           </a:p>
           <a:p>
             <a:pPr marL="0" indent="0">
@@ -6928,7 +6904,7 @@
               <a:buChar char="§"/>
             </a:pPr>
             <a:r>
-              <a:rPr lang="ru-RU" sz="2000" dirty="0">
+              <a:rPr lang="ru-RU" sz="2000" b="1" dirty="0">
                 <a:solidFill>
                   <a:schemeClr val="bg1">
                     <a:lumMod val="95000"/>
@@ -6938,7 +6914,7 @@
               <a:t>Напишете </a:t>
             </a:r>
             <a:r>
-              <a:rPr lang="ru-RU" sz="2000" dirty="0" err="1">
+              <a:rPr lang="ru-RU" sz="2000" b="1" dirty="0" err="1">
                 <a:solidFill>
                   <a:schemeClr val="bg1">
                     <a:lumMod val="95000"/>
@@ -6948,7 +6924,7 @@
               <a:t>програма</a:t>
             </a:r>
             <a:r>
-              <a:rPr lang="ru-RU" sz="2000" dirty="0">
+              <a:rPr lang="ru-RU" sz="2000" b="1" dirty="0">
                 <a:solidFill>
                   <a:schemeClr val="bg1">
                     <a:lumMod val="95000"/>
@@ -6958,7 +6934,7 @@
               <a:t>, </a:t>
             </a:r>
             <a:r>
-              <a:rPr lang="ru-RU" sz="2000" dirty="0" err="1">
+              <a:rPr lang="ru-RU" sz="2000" b="1" dirty="0" err="1">
                 <a:solidFill>
                   <a:schemeClr val="bg1">
                     <a:lumMod val="95000"/>
@@ -6968,7 +6944,7 @@
               <a:t>която</a:t>
             </a:r>
             <a:r>
-              <a:rPr lang="ru-RU" sz="2000" dirty="0">
+              <a:rPr lang="ru-RU" sz="2000" b="1" dirty="0">
                 <a:solidFill>
                   <a:schemeClr val="bg1">
                     <a:lumMod val="95000"/>
@@ -6978,7 +6954,7 @@
               <a:t> </a:t>
             </a:r>
             <a:r>
-              <a:rPr lang="ru-RU" sz="2000" dirty="0" err="1">
+              <a:rPr lang="ru-RU" sz="2000" b="1" dirty="0" err="1">
                 <a:solidFill>
                   <a:schemeClr val="bg1">
                     <a:lumMod val="95000"/>
@@ -6988,7 +6964,7 @@
               <a:t>отпечатва</a:t>
             </a:r>
             <a:r>
-              <a:rPr lang="ru-RU" sz="2000" dirty="0">
+              <a:rPr lang="ru-RU" sz="2000" b="1" dirty="0">
                 <a:solidFill>
                   <a:schemeClr val="bg1">
                     <a:lumMod val="95000"/>
@@ -6998,7 +6974,7 @@
               <a:t> на </a:t>
             </a:r>
             <a:r>
-              <a:rPr lang="ru-RU" sz="2000" dirty="0" err="1">
+              <a:rPr lang="ru-RU" sz="2000" b="1" dirty="0" err="1">
                 <a:solidFill>
                   <a:schemeClr val="bg1">
                     <a:lumMod val="95000"/>
@@ -7008,7 +6984,7 @@
               <a:t>конзолата</a:t>
             </a:r>
             <a:r>
-              <a:rPr lang="ru-RU" sz="2000" dirty="0">
+              <a:rPr lang="ru-RU" sz="2000" b="1" dirty="0">
                 <a:solidFill>
                   <a:schemeClr val="bg1">
                     <a:lumMod val="95000"/>
@@ -7018,7 +6994,7 @@
               <a:t> </a:t>
             </a:r>
             <a:r>
-              <a:rPr lang="ru-RU" sz="2000" dirty="0" err="1">
+              <a:rPr lang="ru-RU" sz="2000" b="1" dirty="0" err="1">
                 <a:solidFill>
                   <a:schemeClr val="bg1">
                     <a:lumMod val="95000"/>
@@ -7028,7 +7004,7 @@
               <a:t>числата</a:t>
             </a:r>
             <a:r>
-              <a:rPr lang="ru-RU" sz="2000" dirty="0">
+              <a:rPr lang="ru-RU" sz="2000" b="1" dirty="0">
                 <a:solidFill>
                   <a:schemeClr val="bg1">
                     <a:lumMod val="95000"/>
@@ -7038,7 +7014,7 @@
               <a:t> от 1 до N. </a:t>
             </a:r>
             <a:r>
-              <a:rPr lang="ru-RU" sz="2000" dirty="0" err="1">
+              <a:rPr lang="ru-RU" sz="2000" b="1" dirty="0" err="1">
                 <a:solidFill>
                   <a:schemeClr val="bg1">
                     <a:lumMod val="95000"/>
@@ -7048,7 +7024,7 @@
               <a:t>Числото</a:t>
             </a:r>
             <a:r>
-              <a:rPr lang="ru-RU" sz="2000" dirty="0">
+              <a:rPr lang="ru-RU" sz="2000" b="1" dirty="0">
                 <a:solidFill>
                   <a:schemeClr val="bg1">
                     <a:lumMod val="95000"/>
@@ -7058,7 +7034,7 @@
               <a:t> N се </a:t>
             </a:r>
             <a:r>
-              <a:rPr lang="ru-RU" sz="2000" dirty="0" err="1">
+              <a:rPr lang="ru-RU" sz="2000" b="1" dirty="0" err="1">
                 <a:solidFill>
                   <a:schemeClr val="bg1">
                     <a:lumMod val="95000"/>
@@ -7068,7 +7044,7 @@
               <a:t>въвежда</a:t>
             </a:r>
             <a:r>
-              <a:rPr lang="ru-RU" sz="2000" dirty="0">
+              <a:rPr lang="ru-RU" sz="2000" b="1" dirty="0">
                 <a:solidFill>
                   <a:schemeClr val="bg1">
                     <a:lumMod val="95000"/>
@@ -7078,7 +7054,7 @@
               <a:t> от </a:t>
             </a:r>
             <a:r>
-              <a:rPr lang="ru-RU" sz="2000" dirty="0" err="1">
+              <a:rPr lang="ru-RU" sz="2000" b="1" dirty="0" err="1">
                 <a:solidFill>
                   <a:schemeClr val="bg1">
                     <a:lumMod val="95000"/>
@@ -7088,7 +7064,7 @@
               <a:t>конзолата</a:t>
             </a:r>
             <a:r>
-              <a:rPr lang="ru-RU" sz="2000" dirty="0">
+              <a:rPr lang="ru-RU" sz="2000" b="1" dirty="0">
                 <a:solidFill>
                   <a:schemeClr val="bg1">
                     <a:lumMod val="95000"/>
@@ -7104,7 +7080,7 @@
               <a:buChar char="§"/>
             </a:pPr>
             <a:r>
-              <a:rPr lang="ru-RU" sz="2000" dirty="0">
+              <a:rPr lang="ru-RU" sz="2000" b="1" dirty="0">
                 <a:solidFill>
                   <a:schemeClr val="bg1">
                     <a:lumMod val="95000"/>
@@ -7114,7 +7090,7 @@
               <a:t>Напишете </a:t>
             </a:r>
             <a:r>
-              <a:rPr lang="ru-RU" sz="2000" dirty="0" err="1">
+              <a:rPr lang="ru-RU" sz="2000" b="1" dirty="0" err="1">
                 <a:solidFill>
                   <a:schemeClr val="bg1">
                     <a:lumMod val="95000"/>
@@ -7124,7 +7100,7 @@
               <a:t>програма</a:t>
             </a:r>
             <a:r>
-              <a:rPr lang="ru-RU" sz="2000" dirty="0">
+              <a:rPr lang="ru-RU" sz="2000" b="1" dirty="0">
                 <a:solidFill>
                   <a:schemeClr val="bg1">
                     <a:lumMod val="95000"/>
@@ -7134,7 +7110,7 @@
               <a:t>, </a:t>
             </a:r>
             <a:r>
-              <a:rPr lang="ru-RU" sz="2000" dirty="0" err="1">
+              <a:rPr lang="ru-RU" sz="2000" b="1" dirty="0" err="1">
                 <a:solidFill>
                   <a:schemeClr val="bg1">
                     <a:lumMod val="95000"/>
@@ -7144,7 +7120,7 @@
               <a:t>която</a:t>
             </a:r>
             <a:r>
-              <a:rPr lang="ru-RU" sz="2000" dirty="0">
+              <a:rPr lang="ru-RU" sz="2000" b="1" dirty="0">
                 <a:solidFill>
                   <a:schemeClr val="bg1">
                     <a:lumMod val="95000"/>
@@ -7154,7 +7130,7 @@
               <a:t> </a:t>
             </a:r>
             <a:r>
-              <a:rPr lang="ru-RU" sz="2000" dirty="0" err="1">
+              <a:rPr lang="ru-RU" sz="2000" b="1" dirty="0" err="1">
                 <a:solidFill>
                   <a:schemeClr val="bg1">
                     <a:lumMod val="95000"/>
@@ -7164,7 +7140,7 @@
               <a:t>отпечатва</a:t>
             </a:r>
             <a:r>
-              <a:rPr lang="ru-RU" sz="2000" dirty="0">
+              <a:rPr lang="ru-RU" sz="2000" b="1" dirty="0">
                 <a:solidFill>
                   <a:schemeClr val="bg1">
                     <a:lumMod val="95000"/>
@@ -7174,7 +7150,7 @@
               <a:t> на </a:t>
             </a:r>
             <a:r>
-              <a:rPr lang="ru-RU" sz="2000" dirty="0" err="1">
+              <a:rPr lang="ru-RU" sz="2000" b="1" dirty="0" err="1">
                 <a:solidFill>
                   <a:schemeClr val="bg1">
                     <a:lumMod val="95000"/>
@@ -7184,7 +7160,7 @@
               <a:t>конзолата</a:t>
             </a:r>
             <a:r>
-              <a:rPr lang="ru-RU" sz="2000" dirty="0">
+              <a:rPr lang="ru-RU" sz="2000" b="1" dirty="0">
                 <a:solidFill>
                   <a:schemeClr val="bg1">
                     <a:lumMod val="95000"/>
@@ -7194,7 +7170,7 @@
               <a:t> </a:t>
             </a:r>
             <a:r>
-              <a:rPr lang="ru-RU" sz="2000" dirty="0" err="1">
+              <a:rPr lang="ru-RU" sz="2000" b="1" dirty="0" err="1">
                 <a:solidFill>
                   <a:schemeClr val="bg1">
                     <a:lumMod val="95000"/>
@@ -7204,7 +7180,7 @@
               <a:t>числата</a:t>
             </a:r>
             <a:r>
-              <a:rPr lang="ru-RU" sz="2000" dirty="0">
+              <a:rPr lang="ru-RU" sz="2000" b="1" dirty="0">
                 <a:solidFill>
                   <a:schemeClr val="bg1">
                     <a:lumMod val="95000"/>
@@ -7214,7 +7190,7 @@
               <a:t> от 1 до N, </a:t>
             </a:r>
             <a:r>
-              <a:rPr lang="ru-RU" sz="2000" dirty="0" err="1">
+              <a:rPr lang="ru-RU" sz="2000" b="1" dirty="0" err="1">
                 <a:solidFill>
                   <a:schemeClr val="bg1">
                     <a:lumMod val="95000"/>
@@ -7224,7 +7200,7 @@
               <a:t>които</a:t>
             </a:r>
             <a:r>
-              <a:rPr lang="ru-RU" sz="2000" dirty="0">
+              <a:rPr lang="ru-RU" sz="2000" b="1" dirty="0">
                 <a:solidFill>
                   <a:schemeClr val="bg1">
                     <a:lumMod val="95000"/>
@@ -7234,7 +7210,7 @@
               <a:t> не се делят на 3 и 7. </a:t>
             </a:r>
             <a:r>
-              <a:rPr lang="ru-RU" sz="2000" dirty="0" err="1">
+              <a:rPr lang="ru-RU" sz="2000" b="1" dirty="0" err="1">
                 <a:solidFill>
                   <a:schemeClr val="bg1">
                     <a:lumMod val="95000"/>
@@ -7244,7 +7220,7 @@
               <a:t>Числото</a:t>
             </a:r>
             <a:r>
-              <a:rPr lang="ru-RU" sz="2000" dirty="0">
+              <a:rPr lang="ru-RU" sz="2000" b="1" dirty="0">
                 <a:solidFill>
                   <a:schemeClr val="bg1">
                     <a:lumMod val="95000"/>
@@ -7254,7 +7230,7 @@
               <a:t> N се </a:t>
             </a:r>
             <a:r>
-              <a:rPr lang="ru-RU" sz="2000" dirty="0" err="1">
+              <a:rPr lang="ru-RU" sz="2000" b="1" dirty="0" err="1">
                 <a:solidFill>
                   <a:schemeClr val="bg1">
                     <a:lumMod val="95000"/>
@@ -7264,7 +7240,7 @@
               <a:t>въвежда</a:t>
             </a:r>
             <a:r>
-              <a:rPr lang="ru-RU" sz="2000" dirty="0">
+              <a:rPr lang="ru-RU" sz="2000" b="1" dirty="0">
                 <a:solidFill>
                   <a:schemeClr val="bg1">
                     <a:lumMod val="95000"/>
@@ -7274,7 +7250,7 @@
               <a:t> от </a:t>
             </a:r>
             <a:r>
-              <a:rPr lang="ru-RU" sz="2000" dirty="0" err="1">
+              <a:rPr lang="ru-RU" sz="2000" b="1" dirty="0" err="1">
                 <a:solidFill>
                   <a:schemeClr val="bg1">
                     <a:lumMod val="95000"/>
@@ -7284,7 +7260,7 @@
               <a:t>конзолата</a:t>
             </a:r>
             <a:r>
-              <a:rPr lang="ru-RU" sz="2000" dirty="0">
+              <a:rPr lang="ru-RU" sz="2000" b="1" dirty="0">
                 <a:solidFill>
                   <a:schemeClr val="bg1">
                     <a:lumMod val="95000"/>
@@ -7300,7 +7276,7 @@
               <a:buChar char="§"/>
             </a:pPr>
             <a:r>
-              <a:rPr lang="ru-RU" sz="2000" dirty="0">
+              <a:rPr lang="ru-RU" sz="2000" b="1" dirty="0">
                 <a:solidFill>
                   <a:schemeClr val="bg1">
                     <a:lumMod val="95000"/>
@@ -7310,7 +7286,7 @@
               <a:t>Напишете </a:t>
             </a:r>
             <a:r>
-              <a:rPr lang="ru-RU" sz="2000" dirty="0" err="1">
+              <a:rPr lang="ru-RU" sz="2000" b="1" dirty="0" err="1">
                 <a:solidFill>
                   <a:schemeClr val="bg1">
                     <a:lumMod val="95000"/>
@@ -7320,7 +7296,7 @@
               <a:t>програма</a:t>
             </a:r>
             <a:r>
-              <a:rPr lang="ru-RU" sz="2000" dirty="0">
+              <a:rPr lang="ru-RU" sz="2000" b="1" dirty="0">
                 <a:solidFill>
                   <a:schemeClr val="bg1">
                     <a:lumMod val="95000"/>
@@ -7330,7 +7306,7 @@
               <a:t>, </a:t>
             </a:r>
             <a:r>
-              <a:rPr lang="ru-RU" sz="2000" dirty="0" err="1">
+              <a:rPr lang="ru-RU" sz="2000" b="1" dirty="0" err="1">
                 <a:solidFill>
                   <a:schemeClr val="bg1">
                     <a:lumMod val="95000"/>
@@ -7340,7 +7316,7 @@
               <a:t>която</a:t>
             </a:r>
             <a:r>
-              <a:rPr lang="ru-RU" sz="2000" dirty="0">
+              <a:rPr lang="ru-RU" sz="2000" b="1" dirty="0">
                 <a:solidFill>
                   <a:schemeClr val="bg1">
                     <a:lumMod val="95000"/>
@@ -7350,7 +7326,7 @@
               <a:t> чете от </a:t>
             </a:r>
             <a:r>
-              <a:rPr lang="ru-RU" sz="2000" dirty="0" err="1">
+              <a:rPr lang="ru-RU" sz="2000" b="1" dirty="0" err="1">
                 <a:solidFill>
                   <a:schemeClr val="bg1">
                     <a:lumMod val="95000"/>
@@ -7360,7 +7336,7 @@
               <a:t>конзолата</a:t>
             </a:r>
             <a:r>
-              <a:rPr lang="ru-RU" sz="2000" dirty="0">
+              <a:rPr lang="ru-RU" sz="2000" b="1" dirty="0">
                 <a:solidFill>
                   <a:schemeClr val="bg1">
                     <a:lumMod val="95000"/>
@@ -7370,7 +7346,7 @@
               <a:t> </a:t>
             </a:r>
             <a:r>
-              <a:rPr lang="ru-RU" sz="2000" dirty="0" err="1">
+              <a:rPr lang="ru-RU" sz="2000" b="1" dirty="0" err="1">
                 <a:solidFill>
                   <a:schemeClr val="bg1">
                     <a:lumMod val="95000"/>
@@ -7380,7 +7356,7 @@
               <a:t>поредица</a:t>
             </a:r>
             <a:r>
-              <a:rPr lang="ru-RU" sz="2000" dirty="0">
+              <a:rPr lang="ru-RU" sz="2000" b="1" dirty="0">
                 <a:solidFill>
                   <a:schemeClr val="bg1">
                     <a:lumMod val="95000"/>
@@ -7390,7 +7366,7 @@
               <a:t> от цели числа (примерно 5 числа) и </a:t>
             </a:r>
             <a:r>
-              <a:rPr lang="ru-RU" sz="2000" dirty="0" err="1">
+              <a:rPr lang="ru-RU" sz="2000" b="1" dirty="0" err="1">
                 <a:solidFill>
                   <a:schemeClr val="bg1">
                     <a:lumMod val="95000"/>
@@ -7400,7 +7376,7 @@
               <a:t>отпечатва</a:t>
             </a:r>
             <a:r>
-              <a:rPr lang="ru-RU" sz="2000" dirty="0">
+              <a:rPr lang="ru-RU" sz="2000" b="1" dirty="0">
                 <a:solidFill>
                   <a:schemeClr val="bg1">
                     <a:lumMod val="95000"/>
@@ -7410,7 +7386,7 @@
               <a:t> </a:t>
             </a:r>
             <a:r>
-              <a:rPr lang="ru-RU" sz="2000" dirty="0" err="1">
+              <a:rPr lang="ru-RU" sz="2000" b="1" dirty="0" err="1">
                 <a:solidFill>
                   <a:schemeClr val="bg1">
                     <a:lumMod val="95000"/>
@@ -7420,7 +7396,7 @@
               <a:t>най-малкото</a:t>
             </a:r>
             <a:r>
-              <a:rPr lang="ru-RU" sz="2000" dirty="0">
+              <a:rPr lang="ru-RU" sz="2000" b="1" dirty="0">
                 <a:solidFill>
                   <a:schemeClr val="bg1">
                     <a:lumMod val="95000"/>
@@ -7430,7 +7406,7 @@
               <a:t> и </a:t>
             </a:r>
             <a:r>
-              <a:rPr lang="ru-RU" sz="2000" dirty="0" err="1">
+              <a:rPr lang="ru-RU" sz="2000" b="1" dirty="0" err="1">
                 <a:solidFill>
                   <a:schemeClr val="bg1">
                     <a:lumMod val="95000"/>
@@ -7440,7 +7416,7 @@
               <a:t>най-голямото</a:t>
             </a:r>
             <a:r>
-              <a:rPr lang="ru-RU" sz="2000" dirty="0">
+              <a:rPr lang="ru-RU" sz="2000" b="1" dirty="0">
                 <a:solidFill>
                   <a:schemeClr val="bg1">
                     <a:lumMod val="95000"/>
@@ -7450,7 +7426,7 @@
               <a:t> от </a:t>
             </a:r>
             <a:r>
-              <a:rPr lang="ru-RU" sz="2000" dirty="0" err="1">
+              <a:rPr lang="ru-RU" sz="2000" b="1" dirty="0" err="1">
                 <a:solidFill>
                   <a:schemeClr val="bg1">
                     <a:lumMod val="95000"/>
@@ -7460,7 +7436,7 @@
               <a:t>тях</a:t>
             </a:r>
             <a:r>
-              <a:rPr lang="ru-RU" sz="2000" dirty="0">
+              <a:rPr lang="ru-RU" sz="2000" b="1" dirty="0">
                 <a:solidFill>
                   <a:schemeClr val="bg1">
                     <a:lumMod val="95000"/>
@@ -7584,14 +7560,14 @@
               <a:t> </a:t>
             </a:r>
             <a:r>
-              <a:rPr lang="bg-BG" sz="4000" dirty="0">
+              <a:rPr lang="bg-BG" sz="2200" dirty="0">
                 <a:solidFill>
                   <a:srgbClr val="FF0000"/>
                 </a:solidFill>
               </a:rPr>
               <a:t>*</a:t>
             </a:r>
-            <a:endParaRPr lang="ru-RU" sz="4000" dirty="0">
+            <a:endParaRPr lang="ru-RU" sz="2200" dirty="0">
               <a:solidFill>
                 <a:schemeClr val="bg1">
                   <a:lumMod val="95000"/>
@@ -7713,14 +7689,14 @@
               <a:t> </a:t>
             </a:r>
             <a:r>
-              <a:rPr lang="bg-BG" sz="4000" dirty="0">
+              <a:rPr lang="bg-BG" sz="2200" dirty="0">
                 <a:solidFill>
                   <a:srgbClr val="FF0000"/>
                 </a:solidFill>
               </a:rPr>
               <a:t>*</a:t>
             </a:r>
-            <a:endParaRPr lang="ru-RU" sz="4000" dirty="0" smtClean="0">
+            <a:endParaRPr lang="ru-RU" sz="2200" dirty="0" smtClean="0">
               <a:solidFill>
                 <a:schemeClr val="bg1">
                   <a:lumMod val="95000"/>
@@ -8284,25 +8260,8 @@
                   </a:schemeClr>
                 </a:solidFill>
               </a:rPr>
-              <a:t> </a:t>
-            </a:r>
-            <a:r>
-              <a:rPr lang="en-US" dirty="0" smtClean="0">
-                <a:solidFill>
-                  <a:schemeClr val="bg1">
-                    <a:lumMod val="95000"/>
-                  </a:schemeClr>
-                </a:solidFill>
-              </a:rPr>
-              <a:t>{</a:t>
-            </a:r>
-            <a:endParaRPr lang="en-US" dirty="0" smtClean="0">
-              <a:solidFill>
-                <a:schemeClr val="bg1">
-                  <a:lumMod val="95000"/>
-                </a:schemeClr>
-              </a:solidFill>
-            </a:endParaRPr>
+              <a:t> {</a:t>
+            </a:r>
           </a:p>
           <a:p>
             <a:pPr marL="0" indent="0">
@@ -8645,15 +8604,7 @@
                   <a:schemeClr val="bg1"/>
                 </a:solidFill>
               </a:rPr>
-              <a:t>while</a:t>
-            </a:r>
-            <a:r>
-              <a:rPr lang="en-US" dirty="0" smtClean="0">
-                <a:solidFill>
-                  <a:schemeClr val="bg1"/>
-                </a:solidFill>
-              </a:rPr>
-              <a:t>.</a:t>
+              <a:t>while.</a:t>
             </a:r>
             <a:endParaRPr lang="en-US" dirty="0">
               <a:solidFill>
@@ -9109,13 +9060,6 @@
               </a:rPr>
               <a:t>do {</a:t>
             </a:r>
-            <a:endParaRPr lang="en-US" dirty="0" smtClean="0">
-              <a:solidFill>
-                <a:schemeClr val="bg1">
-                  <a:lumMod val="95000"/>
-                </a:schemeClr>
-              </a:solidFill>
-            </a:endParaRPr>
           </a:p>
           <a:p>
             <a:pPr marL="0" indent="0">

</xml_diff>